<commit_message>
updating slides and sliding window demo
</commit_message>
<xml_diff>
--- a/Intro to Partitioning.pptx
+++ b/Intro to Partitioning.pptx
@@ -3593,7 +3593,7 @@
             </a:pPr>
             <a:r>
               <a:rPr lang="en-US" altLang="en-US" dirty="0"/>
-              <a:t>Defines partition boundaries</a:t>
+              <a:t>WORK ON THIS!!!!!</a:t>
             </a:r>
             <a:br>
               <a:rPr lang="en-US" altLang="en-US" dirty="0">
@@ -5452,21 +5452,8 @@
                   <a:schemeClr val="accent1"/>
                 </a:solidFill>
               </a:rPr>
-              <a:t>Merging &amp; Splitting </a:t>
-            </a:r>
-            <a:r>
-              <a:rPr lang="en-GB" dirty="0" err="1">
-                <a:solidFill>
-                  <a:schemeClr val="accent1"/>
-                </a:solidFill>
-              </a:rPr>
-              <a:t>Partions</a:t>
-            </a:r>
-            <a:endParaRPr lang="en-GB" dirty="0">
-              <a:solidFill>
-                <a:schemeClr val="accent1"/>
-              </a:solidFill>
-            </a:endParaRPr>
+              <a:t>Merging &amp; Splitting Partitions</a:t>
+            </a:r>
           </a:p>
         </p:txBody>
       </p:sp>

</xml_diff>

<commit_message>
updated slides and demo 1
</commit_message>
<xml_diff>
--- a/Intro to Partitioning.pptx
+++ b/Intro to Partitioning.pptx
@@ -149,7 +149,18 @@
   </p:defaultTextStyle>
   <p:extLst>
     <p:ext uri="{EFAFB233-063F-42B5-8137-9DF3F51BA10A}">
-      <p15:sldGuideLst xmlns:p15="http://schemas.microsoft.com/office/powerpoint/2012/main"/>
+      <p15:sldGuideLst xmlns:p15="http://schemas.microsoft.com/office/powerpoint/2012/main">
+        <p15:guide id="1" orient="horz" pos="2160" userDrawn="1">
+          <p15:clr>
+            <a:srgbClr val="A4A3A4"/>
+          </p15:clr>
+        </p15:guide>
+        <p15:guide id="2" pos="3840" userDrawn="1">
+          <p15:clr>
+            <a:srgbClr val="A4A3A4"/>
+          </p15:clr>
+        </p15:guide>
+      </p15:sldGuideLst>
     </p:ext>
   </p:extLst>
 </p:presentation>
@@ -237,7 +248,7 @@
           <a:p>
             <a:fld id="{5DD5D27D-F6C1-457C-97EB-5B89E5036C9E}" type="datetimeFigureOut">
               <a:rPr lang="en-IE" smtClean="0"/>
-              <a:t>18/02/2018</a:t>
+              <a:t>19/02/2018</a:t>
             </a:fld>
             <a:endParaRPr lang="en-IE"/>
           </a:p>
@@ -636,7 +647,7 @@
           <a:p>
             <a:fld id="{A64C863B-FA9B-4512-A178-D5CD000B838D}" type="datetimeFigureOut">
               <a:rPr lang="en-GB" smtClean="0"/>
-              <a:t>18/02/2018</a:t>
+              <a:t>19/02/2018</a:t>
             </a:fld>
             <a:endParaRPr lang="en-GB"/>
           </a:p>
@@ -806,7 +817,7 @@
           <a:p>
             <a:fld id="{A64C863B-FA9B-4512-A178-D5CD000B838D}" type="datetimeFigureOut">
               <a:rPr lang="en-GB" smtClean="0"/>
-              <a:t>18/02/2018</a:t>
+              <a:t>19/02/2018</a:t>
             </a:fld>
             <a:endParaRPr lang="en-GB"/>
           </a:p>
@@ -986,7 +997,7 @@
           <a:p>
             <a:fld id="{A64C863B-FA9B-4512-A178-D5CD000B838D}" type="datetimeFigureOut">
               <a:rPr lang="en-GB" smtClean="0"/>
-              <a:t>18/02/2018</a:t>
+              <a:t>19/02/2018</a:t>
             </a:fld>
             <a:endParaRPr lang="en-GB"/>
           </a:p>
@@ -1156,7 +1167,7 @@
           <a:p>
             <a:fld id="{A64C863B-FA9B-4512-A178-D5CD000B838D}" type="datetimeFigureOut">
               <a:rPr lang="en-GB" smtClean="0"/>
-              <a:t>18/02/2018</a:t>
+              <a:t>19/02/2018</a:t>
             </a:fld>
             <a:endParaRPr lang="en-GB"/>
           </a:p>
@@ -1402,7 +1413,7 @@
           <a:p>
             <a:fld id="{A64C863B-FA9B-4512-A178-D5CD000B838D}" type="datetimeFigureOut">
               <a:rPr lang="en-GB" smtClean="0"/>
-              <a:t>18/02/2018</a:t>
+              <a:t>19/02/2018</a:t>
             </a:fld>
             <a:endParaRPr lang="en-GB"/>
           </a:p>
@@ -1634,7 +1645,7 @@
           <a:p>
             <a:fld id="{A64C863B-FA9B-4512-A178-D5CD000B838D}" type="datetimeFigureOut">
               <a:rPr lang="en-GB" smtClean="0"/>
-              <a:t>18/02/2018</a:t>
+              <a:t>19/02/2018</a:t>
             </a:fld>
             <a:endParaRPr lang="en-GB"/>
           </a:p>
@@ -2001,7 +2012,7 @@
           <a:p>
             <a:fld id="{A64C863B-FA9B-4512-A178-D5CD000B838D}" type="datetimeFigureOut">
               <a:rPr lang="en-GB" smtClean="0"/>
-              <a:t>18/02/2018</a:t>
+              <a:t>19/02/2018</a:t>
             </a:fld>
             <a:endParaRPr lang="en-GB"/>
           </a:p>
@@ -2119,7 +2130,7 @@
           <a:p>
             <a:fld id="{A64C863B-FA9B-4512-A178-D5CD000B838D}" type="datetimeFigureOut">
               <a:rPr lang="en-GB" smtClean="0"/>
-              <a:t>18/02/2018</a:t>
+              <a:t>19/02/2018</a:t>
             </a:fld>
             <a:endParaRPr lang="en-GB"/>
           </a:p>
@@ -2214,7 +2225,7 @@
           <a:p>
             <a:fld id="{A64C863B-FA9B-4512-A178-D5CD000B838D}" type="datetimeFigureOut">
               <a:rPr lang="en-GB" smtClean="0"/>
-              <a:t>18/02/2018</a:t>
+              <a:t>19/02/2018</a:t>
             </a:fld>
             <a:endParaRPr lang="en-GB"/>
           </a:p>
@@ -2491,7 +2502,7 @@
           <a:p>
             <a:fld id="{A64C863B-FA9B-4512-A178-D5CD000B838D}" type="datetimeFigureOut">
               <a:rPr lang="en-GB" smtClean="0"/>
-              <a:t>18/02/2018</a:t>
+              <a:t>19/02/2018</a:t>
             </a:fld>
             <a:endParaRPr lang="en-GB"/>
           </a:p>
@@ -2744,7 +2755,7 @@
           <a:p>
             <a:fld id="{A64C863B-FA9B-4512-A178-D5CD000B838D}" type="datetimeFigureOut">
               <a:rPr lang="en-GB" smtClean="0"/>
-              <a:t>18/02/2018</a:t>
+              <a:t>19/02/2018</a:t>
             </a:fld>
             <a:endParaRPr lang="en-GB"/>
           </a:p>
@@ -2966,7 +2977,7 @@
           <a:p>
             <a:fld id="{A64C863B-FA9B-4512-A178-D5CD000B838D}" type="datetimeFigureOut">
               <a:rPr lang="en-GB" smtClean="0"/>
-              <a:t>18/02/2018</a:t>
+              <a:t>19/02/2018</a:t>
             </a:fld>
             <a:endParaRPr lang="en-GB"/>
           </a:p>
@@ -3383,8 +3394,8 @@
         </p:nvSpPr>
         <p:spPr>
           <a:xfrm>
-            <a:off x="1641984" y="1214438"/>
-            <a:ext cx="9144000" cy="2387600"/>
+            <a:off x="1524000" y="2651760"/>
+            <a:ext cx="9144000" cy="950278"/>
           </a:xfrm>
         </p:spPr>
         <p:txBody>
@@ -3403,30 +3414,6 @@
               </a:rPr>
               <a:t>Introduction to partitioning</a:t>
             </a:r>
-          </a:p>
-        </p:txBody>
-      </p:sp>
-      <p:sp>
-        <p:nvSpPr>
-          <p:cNvPr id="5" name="Subtitle 4"/>
-          <p:cNvSpPr>
-            <a:spLocks noGrp="1"/>
-          </p:cNvSpPr>
-          <p:nvPr>
-            <p:ph type="subTitle" idx="1"/>
-          </p:nvPr>
-        </p:nvSpPr>
-        <p:spPr>
-          <a:xfrm>
-            <a:off x="1641984" y="3602038"/>
-            <a:ext cx="9144000" cy="1655762"/>
-          </a:xfrm>
-        </p:spPr>
-        <p:txBody>
-          <a:bodyPr/>
-          <a:lstStyle/>
-          <a:p>
-            <a:endParaRPr lang="en-GB" dirty="0"/>
           </a:p>
         </p:txBody>
       </p:sp>
@@ -3517,7 +3504,7 @@
               <a:buNone/>
             </a:pPr>
             <a:r>
-              <a:rPr lang="en-US" altLang="en-US" dirty="0"/>
+              <a:rPr lang="en-US" altLang="en-US" sz="3200" dirty="0"/>
               <a:t>Maps rows in the table to a partition</a:t>
             </a:r>
             <a:br>
@@ -4051,7 +4038,7 @@
         <p:spPr>
           <a:xfrm>
             <a:off x="331596" y="1570139"/>
-            <a:ext cx="10611707" cy="523220"/>
+            <a:ext cx="10611707" cy="584775"/>
           </a:xfrm>
           <a:prstGeom prst="rect">
             <a:avLst/>
@@ -4065,10 +4052,10 @@
           <a:lstStyle/>
           <a:p>
             <a:r>
-              <a:rPr lang="en-GB" sz="2800" dirty="0"/>
+              <a:rPr lang="en-GB" sz="3200" dirty="0"/>
               <a:t>Defines which side of the boundary the value specified belongs</a:t>
             </a:r>
-            <a:endParaRPr lang="en-IE" sz="2800" dirty="0"/>
+            <a:endParaRPr lang="en-IE" sz="3200" dirty="0"/>
           </a:p>
         </p:txBody>
       </p:sp>
@@ -4450,7 +4437,7 @@
               <a:buNone/>
             </a:pPr>
             <a:r>
-              <a:rPr lang="en-US" altLang="en-US" dirty="0"/>
+              <a:rPr lang="en-US" altLang="en-US" sz="3200" dirty="0"/>
               <a:t>Maps partitions to filegroups</a:t>
             </a:r>
             <a:br>
@@ -5540,7 +5527,7 @@
               <a:buNone/>
             </a:pPr>
             <a:r>
-              <a:rPr lang="en-GB" dirty="0"/>
+              <a:rPr lang="en-GB" sz="3200" dirty="0"/>
               <a:t>Create on the partition scheme specifying the partitioning key</a:t>
             </a:r>
           </a:p>
@@ -5555,23 +5542,32 @@
               <a:buNone/>
             </a:pPr>
             <a:r>
-              <a:rPr lang="en-GB" dirty="0"/>
-              <a:t>Unique – the partitioning key has to be explicitly specified in the index</a:t>
-            </a:r>
-          </a:p>
-          <a:p>
-            <a:pPr marL="0" indent="0">
-              <a:buNone/>
-            </a:pPr>
-            <a:endParaRPr lang="en-GB" dirty="0"/>
-          </a:p>
-          <a:p>
-            <a:pPr marL="0" indent="0">
-              <a:buNone/>
-            </a:pPr>
-            <a:r>
-              <a:rPr lang="en-GB" dirty="0"/>
-              <a:t>Nonunique – the partitioning key will be added by SQL if not explicitly specified </a:t>
+              <a:rPr lang="en-GB" sz="3200" b="1" dirty="0">
+                <a:solidFill>
+                  <a:schemeClr val="accent1">
+                    <a:lumMod val="75000"/>
+                  </a:schemeClr>
+                </a:solidFill>
+              </a:rPr>
+              <a:t>Unique</a:t>
+            </a:r>
+            <a:r>
+              <a:rPr lang="en-GB" sz="3200" dirty="0"/>
+              <a:t> – the partitioning key has to be explicitly specified </a:t>
+            </a:r>
+            <a:r>
+              <a:rPr lang="en-GB" sz="3200" b="1" dirty="0">
+                <a:solidFill>
+                  <a:schemeClr val="accent1">
+                    <a:lumMod val="75000"/>
+                  </a:schemeClr>
+                </a:solidFill>
+              </a:rPr>
+              <a:t>Nonunique</a:t>
+            </a:r>
+            <a:r>
+              <a:rPr lang="en-GB" sz="3200" dirty="0"/>
+              <a:t> – the partitioning key will be added by SQL if not 		     explicitly specified </a:t>
             </a:r>
           </a:p>
         </p:txBody>
@@ -5666,43 +5662,58 @@
           </a:xfrm>
         </p:spPr>
         <p:txBody>
-          <a:bodyPr/>
+          <a:bodyPr>
+            <a:normAutofit/>
+          </a:bodyPr>
           <a:lstStyle/>
           <a:p>
             <a:pPr marL="0" indent="0">
               <a:buNone/>
             </a:pPr>
             <a:r>
-              <a:rPr lang="en-US" altLang="en-US" dirty="0"/>
+              <a:rPr lang="en-US" altLang="en-US" sz="3200" dirty="0"/>
               <a:t>An index that is created using the same partition scheme as the base table is </a:t>
             </a:r>
             <a:r>
-              <a:rPr lang="en-US" altLang="en-US" b="1" i="1" dirty="0"/>
+              <a:rPr lang="en-US" altLang="en-US" sz="3200" b="1" i="1" dirty="0">
+                <a:solidFill>
+                  <a:schemeClr val="accent1">
+                    <a:lumMod val="75000"/>
+                  </a:schemeClr>
+                </a:solidFill>
+              </a:rPr>
               <a:t>aligned</a:t>
             </a:r>
             <a:br>
-              <a:rPr lang="en-US" altLang="en-US" b="1" i="1" dirty="0"/>
+              <a:rPr lang="en-US" altLang="en-US" sz="3200" b="1" i="1" dirty="0"/>
             </a:br>
-            <a:br>
-              <a:rPr lang="en-US" altLang="en-US" b="1" i="1" dirty="0"/>
-            </a:br>
-            <a:r>
-              <a:rPr lang="en-US" altLang="en-US" dirty="0"/>
-              <a:t>An index that is created on a different </a:t>
-            </a:r>
-            <a:r>
-              <a:rPr lang="en-US" altLang="en-US" dirty="0" err="1"/>
-              <a:t>filegroup</a:t>
-            </a:r>
-            <a:r>
-              <a:rPr lang="en-US" altLang="en-US" dirty="0"/>
-              <a:t> or using a different partition scheme is </a:t>
-            </a:r>
-            <a:r>
-              <a:rPr lang="en-US" altLang="en-US" b="1" i="1" dirty="0"/>
+            <a:endParaRPr lang="en-US" altLang="en-US" sz="3200" b="1" i="1" dirty="0"/>
+          </a:p>
+          <a:p>
+            <a:pPr marL="0" indent="0">
+              <a:buNone/>
+            </a:pPr>
+            <a:r>
+              <a:rPr lang="en-US" altLang="en-US" sz="3200" dirty="0"/>
+              <a:t>An index that is created on a different filegroup or using a different partition scheme is </a:t>
+            </a:r>
+            <a:r>
+              <a:rPr lang="en-US" altLang="en-US" sz="3200" b="1" i="1" dirty="0">
+                <a:solidFill>
+                  <a:schemeClr val="accent1">
+                    <a:lumMod val="75000"/>
+                  </a:schemeClr>
+                </a:solidFill>
+              </a:rPr>
               <a:t>non-aligned</a:t>
             </a:r>
-            <a:endParaRPr lang="en-GB" dirty="0"/>
+            <a:endParaRPr lang="en-GB" sz="3200" dirty="0">
+              <a:solidFill>
+                <a:schemeClr val="accent1">
+                  <a:lumMod val="75000"/>
+                </a:schemeClr>
+              </a:solidFill>
+            </a:endParaRPr>
           </a:p>
         </p:txBody>
       </p:sp>
@@ -5796,30 +5807,56 @@
           </a:xfrm>
         </p:spPr>
         <p:txBody>
-          <a:bodyPr/>
+          <a:bodyPr>
+            <a:normAutofit/>
+          </a:bodyPr>
           <a:lstStyle/>
           <a:p>
             <a:pPr marL="0" indent="0">
               <a:buNone/>
             </a:pPr>
             <a:r>
-              <a:rPr lang="en-GB" dirty="0"/>
-              <a:t>Unique - the partitioning key has to be explicitly specified in the index</a:t>
+              <a:rPr lang="en-GB" sz="3200" b="1" dirty="0">
+                <a:solidFill>
+                  <a:schemeClr val="accent1">
+                    <a:lumMod val="75000"/>
+                  </a:schemeClr>
+                </a:solidFill>
+              </a:rPr>
+              <a:t>Unique</a:t>
+            </a:r>
+            <a:r>
+              <a:rPr lang="en-GB" sz="3200" b="1" dirty="0"/>
+              <a:t> </a:t>
+            </a:r>
+            <a:r>
+              <a:rPr lang="en-GB" sz="3200" dirty="0"/>
+              <a:t>- the partitioning key has to be explicitly specified</a:t>
             </a:r>
           </a:p>
           <a:p>
             <a:pPr marL="0" indent="0">
               <a:buNone/>
             </a:pPr>
-            <a:endParaRPr lang="en-GB" dirty="0"/>
+            <a:endParaRPr lang="en-GB" sz="3200" dirty="0"/>
           </a:p>
           <a:p>
             <a:pPr marL="0" indent="0">
               <a:buNone/>
             </a:pPr>
             <a:r>
-              <a:rPr lang="en-GB" dirty="0"/>
-              <a:t>Nonunique - the partitioning key will be added by SQL if not explicitly 			specified  as an included column</a:t>
+              <a:rPr lang="en-GB" sz="3200" b="1" dirty="0">
+                <a:solidFill>
+                  <a:schemeClr val="accent1">
+                    <a:lumMod val="75000"/>
+                  </a:schemeClr>
+                </a:solidFill>
+              </a:rPr>
+              <a:t>Nonunique</a:t>
+            </a:r>
+            <a:r>
+              <a:rPr lang="en-GB" sz="3200" dirty="0"/>
+              <a:t> - the partitioning key will be added by SQL if not 			  explicitly specified as an included column</a:t>
             </a:r>
           </a:p>
         </p:txBody>
@@ -5954,7 +5991,7 @@
           <a:lstStyle/>
           <a:p>
             <a:r>
-              <a:rPr lang="en-GB" sz="2800" b="1" dirty="0"/>
+              <a:rPr lang="en-GB" sz="3200" b="1" dirty="0"/>
               <a:t>Andrew Pruski</a:t>
             </a:r>
           </a:p>
@@ -6256,13 +6293,13 @@
         </p:nvSpPr>
         <p:spPr>
           <a:xfrm>
-            <a:off x="838200" y="1859492"/>
+            <a:off x="838200" y="1956056"/>
             <a:ext cx="10515600" cy="4351338"/>
           </a:xfrm>
         </p:spPr>
         <p:txBody>
           <a:bodyPr>
-            <a:normAutofit fontScale="92500" lnSpcReduction="10000"/>
+            <a:normAutofit lnSpcReduction="10000"/>
           </a:bodyPr>
           <a:lstStyle/>
           <a:p>
@@ -6270,7 +6307,7 @@
               <a:buNone/>
             </a:pPr>
             <a:r>
-              <a:rPr lang="en-US" altLang="en-US" dirty="0"/>
+              <a:rPr lang="en-US" altLang="en-US" sz="3500" dirty="0"/>
               <a:t>Removes a partition</a:t>
             </a:r>
           </a:p>
@@ -6278,56 +6315,34 @@
             <a:pPr marL="0" indent="0">
               <a:buNone/>
             </a:pPr>
-            <a:endParaRPr lang="en-US" altLang="en-US" dirty="0">
-              <a:solidFill>
-                <a:srgbClr val="0064C3"/>
-              </a:solidFill>
-            </a:endParaRPr>
+            <a:r>
+              <a:rPr lang="en-US" altLang="en-US" sz="3500" dirty="0"/>
+              <a:t>Effectively “merges” two partitions into one</a:t>
+            </a:r>
           </a:p>
           <a:p>
             <a:pPr marL="0" indent="0">
               <a:buNone/>
             </a:pPr>
             <a:r>
-              <a:rPr lang="en-US" altLang="en-US" dirty="0"/>
-              <a:t>Effectively “merges” two partitions into one</a:t>
+              <a:rPr lang="en-US" altLang="en-US" sz="3500" dirty="0"/>
+              <a:t>Meta-data only operation if performed on an empty partition</a:t>
             </a:r>
           </a:p>
           <a:p>
             <a:pPr marL="0" indent="0">
               <a:buNone/>
             </a:pPr>
-            <a:endParaRPr lang="en-US" altLang="en-US" dirty="0"/>
-          </a:p>
-          <a:p>
-            <a:pPr marL="0" indent="0">
-              <a:buNone/>
-            </a:pPr>
-            <a:r>
-              <a:rPr lang="en-US" altLang="en-US" dirty="0"/>
-              <a:t>Meta-data only operation if performed on an empty partition</a:t>
-            </a:r>
-          </a:p>
-          <a:p>
-            <a:pPr marL="0" indent="0">
-              <a:buNone/>
-            </a:pPr>
-            <a:endParaRPr lang="en-US" altLang="en-US" dirty="0"/>
-          </a:p>
-          <a:p>
-            <a:pPr marL="0" indent="0">
-              <a:buNone/>
-            </a:pPr>
-            <a:r>
-              <a:rPr lang="en-US" altLang="en-US" dirty="0"/>
+            <a:r>
+              <a:rPr lang="en-US" altLang="en-US" sz="3500" dirty="0"/>
               <a:t>Data </a:t>
             </a:r>
             <a:r>
-              <a:rPr lang="en-US" altLang="en-US" i="1" dirty="0"/>
+              <a:rPr lang="en-US" altLang="en-US" sz="3500" i="1" dirty="0"/>
               <a:t>will</a:t>
             </a:r>
             <a:r>
-              <a:rPr lang="en-US" altLang="en-US" dirty="0"/>
+              <a:rPr lang="en-US" altLang="en-US" sz="3500" dirty="0"/>
               <a:t> be moved if partition is not empty, causing blocking and transaction log growth</a:t>
             </a:r>
             <a:br>
@@ -6463,7 +6478,7 @@
               </a:rPr>
             </a:br>
             <a:r>
-              <a:rPr lang="en-GB" dirty="0">
+              <a:rPr lang="en-GB" sz="3200" dirty="0">
                 <a:solidFill>
                   <a:srgbClr val="0000FF"/>
                 </a:solidFill>
@@ -6472,7 +6487,7 @@
               <a:t>ALTER</a:t>
             </a:r>
             <a:r>
-              <a:rPr lang="en-GB" dirty="0">
+              <a:rPr lang="en-GB" sz="3200" dirty="0">
                 <a:solidFill>
                   <a:prstClr val="black"/>
                 </a:solidFill>
@@ -6481,7 +6496,7 @@
               <a:t> </a:t>
             </a:r>
             <a:r>
-              <a:rPr lang="en-GB" dirty="0">
+              <a:rPr lang="en-GB" sz="3200" dirty="0">
                 <a:solidFill>
                   <a:srgbClr val="0000FF"/>
                 </a:solidFill>
@@ -6490,7 +6505,7 @@
               <a:t>PARTITION</a:t>
             </a:r>
             <a:r>
-              <a:rPr lang="en-GB" dirty="0">
+              <a:rPr lang="en-GB" sz="3200" dirty="0">
                 <a:solidFill>
                   <a:prstClr val="black"/>
                 </a:solidFill>
@@ -6499,7 +6514,7 @@
               <a:t> </a:t>
             </a:r>
             <a:r>
-              <a:rPr lang="en-GB" dirty="0">
+              <a:rPr lang="en-GB" sz="3200" dirty="0">
                 <a:solidFill>
                   <a:srgbClr val="0000FF"/>
                 </a:solidFill>
@@ -6508,7 +6523,7 @@
               <a:t>FUNCTION</a:t>
             </a:r>
             <a:r>
-              <a:rPr lang="en-GB" dirty="0">
+              <a:rPr lang="en-GB" sz="3200" dirty="0">
                 <a:solidFill>
                   <a:prstClr val="black"/>
                 </a:solidFill>
@@ -6517,7 +6532,7 @@
               <a:t> </a:t>
             </a:r>
             <a:r>
-              <a:rPr lang="en-GB" dirty="0">
+              <a:rPr lang="en-GB" sz="3200" dirty="0">
                 <a:solidFill>
                   <a:srgbClr val="808080"/>
                 </a:solidFill>
@@ -6526,7 +6541,7 @@
               <a:t>[</a:t>
             </a:r>
             <a:r>
-              <a:rPr lang="en-GB" i="1" dirty="0">
+              <a:rPr lang="en-GB" sz="3200" i="1" dirty="0">
                 <a:solidFill>
                   <a:prstClr val="black"/>
                 </a:solidFill>
@@ -6535,7 +6550,7 @@
               <a:t>NAME</a:t>
             </a:r>
             <a:r>
-              <a:rPr lang="en-GB" dirty="0">
+              <a:rPr lang="en-GB" sz="3200" dirty="0">
                 <a:solidFill>
                   <a:srgbClr val="808080"/>
                 </a:solidFill>
@@ -6544,7 +6559,7 @@
               <a:t>]()</a:t>
             </a:r>
             <a:br>
-              <a:rPr lang="en-GB" dirty="0">
+              <a:rPr lang="en-GB" sz="3200" dirty="0">
                 <a:solidFill>
                   <a:prstClr val="black"/>
                 </a:solidFill>
@@ -6552,7 +6567,7 @@
               </a:rPr>
             </a:br>
             <a:r>
-              <a:rPr lang="en-GB" dirty="0">
+              <a:rPr lang="en-GB" sz="3200" dirty="0">
                 <a:solidFill>
                   <a:srgbClr val="0000FF"/>
                 </a:solidFill>
@@ -6561,7 +6576,7 @@
               <a:t>	MERGE</a:t>
             </a:r>
             <a:r>
-              <a:rPr lang="en-GB" dirty="0">
+              <a:rPr lang="en-GB" sz="3200" dirty="0">
                 <a:solidFill>
                   <a:prstClr val="black"/>
                 </a:solidFill>
@@ -6570,7 +6585,7 @@
               <a:t> </a:t>
             </a:r>
             <a:r>
-              <a:rPr lang="en-GB" dirty="0">
+              <a:rPr lang="en-GB" sz="3200" dirty="0">
                 <a:solidFill>
                   <a:srgbClr val="0000FF"/>
                 </a:solidFill>
@@ -6579,7 +6594,7 @@
               <a:t>RANGE </a:t>
             </a:r>
             <a:r>
-              <a:rPr lang="en-GB" dirty="0">
+              <a:rPr lang="en-GB" sz="3200" dirty="0">
                 <a:solidFill>
                   <a:srgbClr val="808080"/>
                 </a:solidFill>
@@ -6588,13 +6603,13 @@
               <a:t>(</a:t>
             </a:r>
             <a:r>
-              <a:rPr lang="en-GB" i="1" dirty="0">
+              <a:rPr lang="en-GB" sz="3200" i="1" dirty="0">
                 <a:latin typeface="Consolas" panose="020B0609020204030204" pitchFamily="49" charset="0"/>
               </a:rPr>
               <a:t>VALUE</a:t>
             </a:r>
             <a:r>
-              <a:rPr lang="en-GB" dirty="0">
+              <a:rPr lang="en-GB" sz="3200" dirty="0">
                 <a:solidFill>
                   <a:srgbClr val="808080"/>
                 </a:solidFill>
@@ -6602,7 +6617,7 @@
               </a:rPr>
               <a:t>);</a:t>
             </a:r>
-            <a:endParaRPr lang="en-GB" dirty="0"/>
+            <a:endParaRPr lang="en-GB" sz="3200" dirty="0"/>
           </a:p>
         </p:txBody>
       </p:sp>
@@ -6687,7 +6702,7 @@
         </p:spPr>
         <p:txBody>
           <a:bodyPr>
-            <a:normAutofit fontScale="85000" lnSpcReduction="10000"/>
+            <a:normAutofit/>
           </a:bodyPr>
           <a:lstStyle/>
           <a:p>
@@ -6695,7 +6710,7 @@
               <a:buNone/>
             </a:pPr>
             <a:r>
-              <a:rPr lang="en-US" altLang="en-US" dirty="0"/>
+              <a:rPr lang="en-US" altLang="en-US" sz="3200" dirty="0"/>
               <a:t>Creates a new partition with new boundary value</a:t>
             </a:r>
           </a:p>
@@ -6703,67 +6718,43 @@
             <a:pPr marL="0" indent="0">
               <a:buNone/>
             </a:pPr>
-            <a:endParaRPr lang="en-US" altLang="en-US" dirty="0"/>
+            <a:r>
+              <a:rPr lang="en-US" altLang="en-US" sz="3200" dirty="0"/>
+              <a:t>New boundary value must be distinct from other values</a:t>
+            </a:r>
           </a:p>
           <a:p>
             <a:pPr marL="0" indent="0">
               <a:buNone/>
             </a:pPr>
             <a:r>
-              <a:rPr lang="en-US" altLang="en-US" dirty="0"/>
-              <a:t>New boundary value must be distinct from other values</a:t>
+              <a:rPr lang="en-US" altLang="en-US" sz="3200" dirty="0"/>
+              <a:t>Takes a schema modification lock on the table</a:t>
             </a:r>
           </a:p>
           <a:p>
             <a:pPr marL="0" indent="0">
               <a:buNone/>
             </a:pPr>
-            <a:endParaRPr lang="en-US" altLang="en-US" dirty="0"/>
+            <a:r>
+              <a:rPr lang="en-US" altLang="en-US" sz="3200" dirty="0"/>
+              <a:t>Meta-data only operation if partition is empty</a:t>
+            </a:r>
           </a:p>
           <a:p>
             <a:pPr marL="0" indent="0">
               <a:buNone/>
             </a:pPr>
             <a:r>
-              <a:rPr lang="en-US" altLang="en-US" dirty="0"/>
-              <a:t>Takes a schema modification lock on the table</a:t>
-            </a:r>
-          </a:p>
-          <a:p>
-            <a:pPr marL="0" indent="0">
-              <a:buNone/>
-            </a:pPr>
-            <a:endParaRPr lang="en-US" altLang="en-US" dirty="0"/>
-          </a:p>
-          <a:p>
-            <a:pPr marL="0" indent="0">
-              <a:buNone/>
-            </a:pPr>
-            <a:r>
-              <a:rPr lang="en-US" altLang="en-US" dirty="0"/>
-              <a:t>Meta-data only operation if partition is empty</a:t>
-            </a:r>
-          </a:p>
-          <a:p>
-            <a:pPr marL="0" indent="0">
-              <a:buNone/>
-            </a:pPr>
-            <a:endParaRPr lang="en-US" altLang="en-US" dirty="0"/>
-          </a:p>
-          <a:p>
-            <a:pPr marL="0" indent="0">
-              <a:buNone/>
-            </a:pPr>
-            <a:r>
-              <a:rPr lang="en-US" altLang="en-US" dirty="0"/>
+              <a:rPr lang="en-US" altLang="en-US" sz="3200" dirty="0"/>
               <a:t>SQL </a:t>
             </a:r>
             <a:r>
-              <a:rPr lang="en-US" altLang="en-US" i="1" dirty="0"/>
+              <a:rPr lang="en-US" altLang="en-US" sz="3200" i="1" dirty="0"/>
               <a:t>will</a:t>
             </a:r>
             <a:r>
-              <a:rPr lang="en-US" altLang="en-US" dirty="0"/>
+              <a:rPr lang="en-US" altLang="en-US" sz="3200" dirty="0"/>
               <a:t> move data to the new partition if the data crosses the new boundary value</a:t>
             </a:r>
             <a:br>
@@ -6885,7 +6876,7 @@
               </a:rPr>
             </a:br>
             <a:r>
-              <a:rPr lang="en-GB" dirty="0">
+              <a:rPr lang="en-GB" sz="3200" dirty="0">
                 <a:solidFill>
                   <a:srgbClr val="0000FF"/>
                 </a:solidFill>
@@ -6894,7 +6885,7 @@
               <a:t>ALTER</a:t>
             </a:r>
             <a:r>
-              <a:rPr lang="en-GB" dirty="0">
+              <a:rPr lang="en-GB" sz="3200" dirty="0">
                 <a:solidFill>
                   <a:prstClr val="black"/>
                 </a:solidFill>
@@ -6903,7 +6894,7 @@
               <a:t> </a:t>
             </a:r>
             <a:r>
-              <a:rPr lang="en-GB" dirty="0">
+              <a:rPr lang="en-GB" sz="3200" dirty="0">
                 <a:solidFill>
                   <a:srgbClr val="0000FF"/>
                 </a:solidFill>
@@ -6912,7 +6903,7 @@
               <a:t>PARTITION</a:t>
             </a:r>
             <a:r>
-              <a:rPr lang="en-GB" dirty="0">
+              <a:rPr lang="en-GB" sz="3200" dirty="0">
                 <a:solidFill>
                   <a:prstClr val="black"/>
                 </a:solidFill>
@@ -6921,7 +6912,7 @@
               <a:t> SCHEME </a:t>
             </a:r>
             <a:r>
-              <a:rPr lang="en-GB" dirty="0">
+              <a:rPr lang="en-GB" sz="3200" dirty="0">
                 <a:solidFill>
                   <a:srgbClr val="808080"/>
                 </a:solidFill>
@@ -6930,7 +6921,7 @@
               <a:t>[</a:t>
             </a:r>
             <a:r>
-              <a:rPr lang="en-GB" i="1" dirty="0">
+              <a:rPr lang="en-GB" sz="3200" i="1" dirty="0">
                 <a:solidFill>
                   <a:prstClr val="black"/>
                 </a:solidFill>
@@ -6939,7 +6930,7 @@
               <a:t>NAME</a:t>
             </a:r>
             <a:r>
-              <a:rPr lang="en-GB" dirty="0">
+              <a:rPr lang="en-GB" sz="3200" dirty="0">
                 <a:solidFill>
                   <a:srgbClr val="808080"/>
                 </a:solidFill>
@@ -6948,7 +6939,7 @@
               <a:t>]</a:t>
             </a:r>
             <a:br>
-              <a:rPr lang="en-GB" dirty="0">
+              <a:rPr lang="en-GB" sz="3200" dirty="0">
                 <a:solidFill>
                   <a:prstClr val="black"/>
                 </a:solidFill>
@@ -6956,7 +6947,7 @@
               </a:rPr>
             </a:br>
             <a:r>
-              <a:rPr lang="en-GB" dirty="0">
+              <a:rPr lang="en-GB" sz="3200" dirty="0">
                 <a:solidFill>
                   <a:srgbClr val="0000FF"/>
                 </a:solidFill>
@@ -6965,7 +6956,7 @@
               <a:t>	NEXT</a:t>
             </a:r>
             <a:r>
-              <a:rPr lang="en-GB" dirty="0">
+              <a:rPr lang="en-GB" sz="3200" dirty="0">
                 <a:solidFill>
                   <a:prstClr val="black"/>
                 </a:solidFill>
@@ -6974,7 +6965,7 @@
               <a:t> USED [</a:t>
             </a:r>
             <a:r>
-              <a:rPr lang="en-GB" i="1" dirty="0">
+              <a:rPr lang="en-GB" sz="3200" i="1" dirty="0">
                 <a:solidFill>
                   <a:prstClr val="black"/>
                 </a:solidFill>
@@ -6983,7 +6974,7 @@
               <a:t>FILEGROUP</a:t>
             </a:r>
             <a:r>
-              <a:rPr lang="en-GB" dirty="0">
+              <a:rPr lang="en-GB" sz="3200" dirty="0">
                 <a:solidFill>
                   <a:prstClr val="black"/>
                 </a:solidFill>
@@ -6992,7 +6983,7 @@
               <a:t>]</a:t>
             </a:r>
             <a:r>
-              <a:rPr lang="en-GB" dirty="0">
+              <a:rPr lang="en-GB" sz="3200" dirty="0">
                 <a:solidFill>
                   <a:srgbClr val="808080"/>
                 </a:solidFill>
@@ -7001,7 +6992,7 @@
               <a:t>;</a:t>
             </a:r>
             <a:br>
-              <a:rPr lang="en-GB" dirty="0">
+              <a:rPr lang="en-GB" sz="3200" dirty="0">
                 <a:solidFill>
                   <a:prstClr val="black"/>
                 </a:solidFill>
@@ -7009,7 +7000,7 @@
               </a:rPr>
             </a:br>
             <a:br>
-              <a:rPr lang="en-GB" dirty="0">
+              <a:rPr lang="en-GB" sz="3200" dirty="0">
                 <a:solidFill>
                   <a:prstClr val="black"/>
                 </a:solidFill>
@@ -7017,7 +7008,7 @@
               </a:rPr>
             </a:br>
             <a:r>
-              <a:rPr lang="en-GB" dirty="0">
+              <a:rPr lang="en-GB" sz="3200" dirty="0">
                 <a:solidFill>
                   <a:srgbClr val="0000FF"/>
                 </a:solidFill>
@@ -7026,7 +7017,7 @@
               <a:t>ALTER</a:t>
             </a:r>
             <a:r>
-              <a:rPr lang="en-GB" dirty="0">
+              <a:rPr lang="en-GB" sz="3200" dirty="0">
                 <a:solidFill>
                   <a:prstClr val="black"/>
                 </a:solidFill>
@@ -7035,7 +7026,7 @@
               <a:t> </a:t>
             </a:r>
             <a:r>
-              <a:rPr lang="en-GB" dirty="0">
+              <a:rPr lang="en-GB" sz="3200" dirty="0">
                 <a:solidFill>
                   <a:srgbClr val="0000FF"/>
                 </a:solidFill>
@@ -7044,7 +7035,7 @@
               <a:t>PARTITION</a:t>
             </a:r>
             <a:r>
-              <a:rPr lang="en-GB" dirty="0">
+              <a:rPr lang="en-GB" sz="3200" dirty="0">
                 <a:solidFill>
                   <a:prstClr val="black"/>
                 </a:solidFill>
@@ -7053,7 +7044,7 @@
               <a:t> </a:t>
             </a:r>
             <a:r>
-              <a:rPr lang="en-GB" dirty="0">
+              <a:rPr lang="en-GB" sz="3200" dirty="0">
                 <a:solidFill>
                   <a:srgbClr val="0000FF"/>
                 </a:solidFill>
@@ -7062,7 +7053,7 @@
               <a:t>FUNCTION</a:t>
             </a:r>
             <a:r>
-              <a:rPr lang="en-GB" dirty="0">
+              <a:rPr lang="en-GB" sz="3200" dirty="0">
                 <a:solidFill>
                   <a:prstClr val="black"/>
                 </a:solidFill>
@@ -7071,7 +7062,7 @@
               <a:t> </a:t>
             </a:r>
             <a:r>
-              <a:rPr lang="en-GB" dirty="0">
+              <a:rPr lang="en-GB" sz="3200" dirty="0">
                 <a:solidFill>
                   <a:srgbClr val="808080"/>
                 </a:solidFill>
@@ -7080,7 +7071,7 @@
               <a:t>[</a:t>
             </a:r>
             <a:r>
-              <a:rPr lang="en-GB" i="1" dirty="0">
+              <a:rPr lang="en-GB" sz="3200" i="1" dirty="0">
                 <a:solidFill>
                   <a:prstClr val="black"/>
                 </a:solidFill>
@@ -7089,7 +7080,7 @@
               <a:t>NAME</a:t>
             </a:r>
             <a:r>
-              <a:rPr lang="en-GB" dirty="0">
+              <a:rPr lang="en-GB" sz="3200" dirty="0">
                 <a:solidFill>
                   <a:srgbClr val="808080"/>
                 </a:solidFill>
@@ -7098,7 +7089,7 @@
               <a:t>]()</a:t>
             </a:r>
             <a:br>
-              <a:rPr lang="en-GB" dirty="0">
+              <a:rPr lang="en-GB" sz="3200" dirty="0">
                 <a:solidFill>
                   <a:prstClr val="black"/>
                 </a:solidFill>
@@ -7106,7 +7097,7 @@
               </a:rPr>
             </a:br>
             <a:r>
-              <a:rPr lang="en-GB" dirty="0">
+              <a:rPr lang="en-GB" sz="3200" dirty="0">
                 <a:solidFill>
                   <a:prstClr val="black"/>
                 </a:solidFill>
@@ -7115,7 +7106,7 @@
               <a:t>	SPLIT </a:t>
             </a:r>
             <a:r>
-              <a:rPr lang="en-GB" dirty="0">
+              <a:rPr lang="en-GB" sz="3200" dirty="0">
                 <a:solidFill>
                   <a:srgbClr val="0000FF"/>
                 </a:solidFill>
@@ -7124,7 +7115,7 @@
               <a:t>RANGE </a:t>
             </a:r>
             <a:r>
-              <a:rPr lang="en-GB" dirty="0">
+              <a:rPr lang="en-GB" sz="3200" dirty="0">
                 <a:solidFill>
                   <a:srgbClr val="808080"/>
                 </a:solidFill>
@@ -7133,13 +7124,13 @@
               <a:t>(</a:t>
             </a:r>
             <a:r>
-              <a:rPr lang="en-GB" i="1" dirty="0">
+              <a:rPr lang="en-GB" sz="3200" i="1" dirty="0">
                 <a:latin typeface="Consolas" panose="020B0609020204030204" pitchFamily="49" charset="0"/>
               </a:rPr>
               <a:t>VALUE</a:t>
             </a:r>
             <a:r>
-              <a:rPr lang="en-GB" dirty="0">
+              <a:rPr lang="en-GB" sz="3200" dirty="0">
                 <a:solidFill>
                   <a:srgbClr val="808080"/>
                 </a:solidFill>
@@ -7147,7 +7138,7 @@
               </a:rPr>
               <a:t>);</a:t>
             </a:r>
-            <a:endParaRPr lang="en-GB" dirty="0"/>
+            <a:endParaRPr lang="en-GB" sz="3200" dirty="0"/>
           </a:p>
         </p:txBody>
       </p:sp>
@@ -7394,7 +7385,7 @@
               <a:buNone/>
             </a:pPr>
             <a:r>
-              <a:rPr lang="en-US" altLang="en-US" dirty="0"/>
+              <a:rPr lang="en-US" altLang="en-US" sz="3200" dirty="0"/>
               <a:t>Move a partition from one table to another</a:t>
             </a:r>
           </a:p>
@@ -7402,55 +7393,33 @@
             <a:pPr marL="0" indent="0">
               <a:buNone/>
             </a:pPr>
-            <a:endParaRPr lang="en-US" altLang="en-US" dirty="0">
-              <a:solidFill>
-                <a:srgbClr val="0064C3"/>
-              </a:solidFill>
-            </a:endParaRPr>
+            <a:r>
+              <a:rPr lang="en-US" altLang="en-US" sz="3200" dirty="0"/>
+              <a:t>Meta-data operation, runs immediately </a:t>
+            </a:r>
           </a:p>
           <a:p>
             <a:pPr marL="0" indent="0">
               <a:buNone/>
             </a:pPr>
             <a:r>
-              <a:rPr lang="en-US" altLang="en-US" dirty="0"/>
-              <a:t>Meta-data operation, runs immediately </a:t>
+              <a:rPr lang="en-US" altLang="en-US" sz="3200" dirty="0"/>
+              <a:t>Both tables must have the same structures</a:t>
             </a:r>
           </a:p>
           <a:p>
             <a:pPr marL="0" indent="0">
               <a:buNone/>
             </a:pPr>
-            <a:endParaRPr lang="en-US" altLang="en-US" dirty="0"/>
-          </a:p>
-          <a:p>
-            <a:pPr marL="0" indent="0">
-              <a:buNone/>
-            </a:pPr>
-            <a:r>
-              <a:rPr lang="en-US" altLang="en-US" dirty="0"/>
-              <a:t>Both tables must have the same structures</a:t>
-            </a:r>
-          </a:p>
-          <a:p>
-            <a:pPr marL="0" indent="0">
-              <a:buNone/>
-            </a:pPr>
-            <a:endParaRPr lang="en-US" altLang="en-US" dirty="0"/>
-          </a:p>
-          <a:p>
-            <a:pPr marL="0" indent="0">
-              <a:buNone/>
-            </a:pPr>
-            <a:r>
-              <a:rPr lang="en-US" altLang="en-US" dirty="0"/>
+            <a:r>
+              <a:rPr lang="en-US" altLang="en-US" sz="3200" dirty="0"/>
               <a:t>Destination partition must be empty or…</a:t>
             </a:r>
             <a:br>
-              <a:rPr lang="en-US" altLang="en-US" dirty="0"/>
+              <a:rPr lang="en-US" altLang="en-US" sz="3200" dirty="0"/>
             </a:br>
             <a:r>
-              <a:rPr lang="en-US" altLang="en-US" dirty="0"/>
+              <a:rPr lang="en-US" altLang="en-US" sz="3200" dirty="0"/>
               <a:t>if destination table is not partitioned, it must be completely empty</a:t>
             </a:r>
           </a:p>
@@ -7563,7 +7532,7 @@
               </a:rPr>
             </a:br>
             <a:r>
-              <a:rPr lang="en-GB" dirty="0">
+              <a:rPr lang="en-GB" sz="3200" dirty="0">
                 <a:solidFill>
                   <a:srgbClr val="0000FF"/>
                 </a:solidFill>
@@ -7572,7 +7541,7 @@
               <a:t>ALTER</a:t>
             </a:r>
             <a:r>
-              <a:rPr lang="en-GB" dirty="0">
+              <a:rPr lang="en-GB" sz="3200" dirty="0">
                 <a:solidFill>
                   <a:prstClr val="black"/>
                 </a:solidFill>
@@ -7581,7 +7550,7 @@
               <a:t> </a:t>
             </a:r>
             <a:r>
-              <a:rPr lang="en-GB" dirty="0">
+              <a:rPr lang="en-GB" sz="3200" dirty="0">
                 <a:solidFill>
                   <a:srgbClr val="0000FF"/>
                 </a:solidFill>
@@ -7590,7 +7559,7 @@
               <a:t>TABLE</a:t>
             </a:r>
             <a:r>
-              <a:rPr lang="en-GB" dirty="0">
+              <a:rPr lang="en-GB" sz="3200" dirty="0">
                 <a:solidFill>
                   <a:prstClr val="black"/>
                 </a:solidFill>
@@ -7599,7 +7568,7 @@
               <a:t> </a:t>
             </a:r>
             <a:r>
-              <a:rPr lang="en-GB" dirty="0">
+              <a:rPr lang="en-GB" sz="3200" dirty="0">
                 <a:solidFill>
                   <a:srgbClr val="808080"/>
                 </a:solidFill>
@@ -7608,13 +7577,13 @@
               <a:t>[</a:t>
             </a:r>
             <a:r>
-              <a:rPr lang="en-GB" i="1" dirty="0">
+              <a:rPr lang="en-GB" sz="3200" i="1" dirty="0">
                 <a:latin typeface="Consolas" panose="020B0609020204030204" pitchFamily="49" charset="0"/>
               </a:rPr>
               <a:t>Source Table</a:t>
             </a:r>
             <a:r>
-              <a:rPr lang="en-GB" dirty="0">
+              <a:rPr lang="en-GB" sz="3200" dirty="0">
                 <a:solidFill>
                   <a:srgbClr val="808080"/>
                 </a:solidFill>
@@ -7623,7 +7592,7 @@
               <a:t>]</a:t>
             </a:r>
             <a:br>
-              <a:rPr lang="en-GB" dirty="0">
+              <a:rPr lang="en-GB" sz="3200" dirty="0">
                 <a:solidFill>
                   <a:srgbClr val="808080"/>
                 </a:solidFill>
@@ -7631,7 +7600,7 @@
               </a:rPr>
             </a:br>
             <a:r>
-              <a:rPr lang="en-GB" dirty="0">
+              <a:rPr lang="en-GB" sz="3200" dirty="0">
                 <a:solidFill>
                   <a:prstClr val="black"/>
                 </a:solidFill>
@@ -7640,7 +7609,7 @@
               <a:t>	SWITCH </a:t>
             </a:r>
             <a:r>
-              <a:rPr lang="en-GB" dirty="0">
+              <a:rPr lang="en-GB" sz="3200" dirty="0">
                 <a:solidFill>
                   <a:srgbClr val="0000FF"/>
                 </a:solidFill>
@@ -7649,7 +7618,7 @@
               <a:t>PARTITION</a:t>
             </a:r>
             <a:r>
-              <a:rPr lang="en-GB" dirty="0">
+              <a:rPr lang="en-GB" sz="3200" dirty="0">
                 <a:solidFill>
                   <a:prstClr val="black"/>
                 </a:solidFill>
@@ -7658,13 +7627,13 @@
               <a:t> </a:t>
             </a:r>
             <a:r>
-              <a:rPr lang="en-GB" i="1" dirty="0" err="1">
+              <a:rPr lang="en-GB" sz="3200" i="1" dirty="0" err="1">
                 <a:latin typeface="Consolas" panose="020B0609020204030204" pitchFamily="49" charset="0"/>
               </a:rPr>
               <a:t>Partition_Number</a:t>
             </a:r>
             <a:br>
-              <a:rPr lang="en-GB" dirty="0">
+              <a:rPr lang="en-GB" sz="3200" dirty="0">
                 <a:solidFill>
                   <a:srgbClr val="808080"/>
                 </a:solidFill>
@@ -7672,7 +7641,7 @@
               </a:rPr>
             </a:br>
             <a:r>
-              <a:rPr lang="en-GB" dirty="0">
+              <a:rPr lang="en-GB" sz="3200" dirty="0">
                 <a:solidFill>
                   <a:srgbClr val="0000FF"/>
                 </a:solidFill>
@@ -7681,7 +7650,7 @@
               <a:t>TO</a:t>
             </a:r>
             <a:r>
-              <a:rPr lang="en-GB" dirty="0">
+              <a:rPr lang="en-GB" sz="3200" dirty="0">
                 <a:solidFill>
                   <a:prstClr val="black"/>
                 </a:solidFill>
@@ -7690,7 +7659,7 @@
               <a:t> </a:t>
             </a:r>
             <a:r>
-              <a:rPr lang="en-GB" dirty="0">
+              <a:rPr lang="en-GB" sz="3200" dirty="0">
                 <a:solidFill>
                   <a:srgbClr val="808080"/>
                 </a:solidFill>
@@ -7699,13 +7668,13 @@
               <a:t>[</a:t>
             </a:r>
             <a:r>
-              <a:rPr lang="en-GB" i="1" dirty="0">
+              <a:rPr lang="en-GB" sz="3200" i="1" dirty="0">
                 <a:latin typeface="Consolas" panose="020B0609020204030204" pitchFamily="49" charset="0"/>
               </a:rPr>
               <a:t>Destination Table</a:t>
             </a:r>
             <a:r>
-              <a:rPr lang="en-GB" dirty="0">
+              <a:rPr lang="en-GB" sz="3200" dirty="0">
                 <a:solidFill>
                   <a:srgbClr val="808080"/>
                 </a:solidFill>
@@ -7714,7 +7683,7 @@
               <a:t>] </a:t>
             </a:r>
             <a:br>
-              <a:rPr lang="en-GB" dirty="0">
+              <a:rPr lang="en-GB" sz="3200" dirty="0">
                 <a:solidFill>
                   <a:srgbClr val="808080"/>
                 </a:solidFill>
@@ -7722,7 +7691,7 @@
               </a:rPr>
             </a:br>
             <a:r>
-              <a:rPr lang="en-GB" dirty="0">
+              <a:rPr lang="en-GB" sz="3200" dirty="0">
                 <a:solidFill>
                   <a:srgbClr val="808080"/>
                 </a:solidFill>
@@ -7731,7 +7700,7 @@
               <a:t>	</a:t>
             </a:r>
             <a:r>
-              <a:rPr lang="en-GB" dirty="0">
+              <a:rPr lang="en-GB" sz="3200" dirty="0">
                 <a:solidFill>
                   <a:srgbClr val="0000FF"/>
                 </a:solidFill>
@@ -7740,17 +7709,17 @@
               <a:t>PARTITION</a:t>
             </a:r>
             <a:r>
-              <a:rPr lang="en-GB" dirty="0"/>
+              <a:rPr lang="en-GB" sz="3200" dirty="0"/>
               <a:t> </a:t>
             </a:r>
             <a:r>
-              <a:rPr lang="en-GB" i="1" dirty="0" err="1">
+              <a:rPr lang="en-GB" sz="3200" i="1" dirty="0" err="1">
                 <a:latin typeface="Consolas" panose="020B0609020204030204" pitchFamily="49" charset="0"/>
               </a:rPr>
               <a:t>Partition_Number</a:t>
             </a:r>
             <a:r>
-              <a:rPr lang="en-GB" dirty="0">
+              <a:rPr lang="en-GB" sz="3200" dirty="0">
                 <a:solidFill>
                   <a:srgbClr val="808080"/>
                 </a:solidFill>
@@ -7758,7 +7727,7 @@
               </a:rPr>
               <a:t>;</a:t>
             </a:r>
-            <a:endParaRPr lang="en-GB" dirty="0"/>
+            <a:endParaRPr lang="en-GB" sz="3200" dirty="0"/>
           </a:p>
         </p:txBody>
       </p:sp>
@@ -8119,16 +8088,23 @@
             <p:ph idx="1"/>
           </p:nvPr>
         </p:nvSpPr>
-        <p:spPr/>
-        <p:txBody>
-          <a:bodyPr/>
+        <p:spPr>
+          <a:xfrm>
+            <a:off x="838200" y="1936866"/>
+            <a:ext cx="10515600" cy="4015654"/>
+          </a:xfrm>
+        </p:spPr>
+        <p:txBody>
+          <a:bodyPr>
+            <a:normAutofit/>
+          </a:bodyPr>
           <a:lstStyle/>
           <a:p>
             <a:pPr marL="0" indent="0">
               <a:buNone/>
             </a:pPr>
             <a:r>
-              <a:rPr lang="en-GB" dirty="0"/>
+              <a:rPr lang="en-GB" sz="3200" dirty="0"/>
               <a:t>Method to remove old data and bring in new data periodically</a:t>
             </a:r>
           </a:p>
@@ -8136,32 +8112,20 @@
             <a:pPr marL="0" indent="0">
               <a:buNone/>
             </a:pPr>
-            <a:endParaRPr lang="en-GB" dirty="0"/>
+            <a:r>
+              <a:rPr lang="en-GB" sz="3200" dirty="0"/>
+              <a:t>Implements the SWITCH, MERGE, &amp; SPLIT functions</a:t>
+            </a:r>
           </a:p>
           <a:p>
             <a:pPr marL="0" indent="0">
               <a:buNone/>
             </a:pPr>
             <a:r>
-              <a:rPr lang="en-GB" dirty="0"/>
-              <a:t>Implements the SWITCH, MERGE, &amp; SPLIT functions</a:t>
-            </a:r>
-          </a:p>
-          <a:p>
-            <a:pPr marL="0" indent="0">
-              <a:buNone/>
-            </a:pPr>
-            <a:endParaRPr lang="en-GB" dirty="0"/>
-          </a:p>
-          <a:p>
-            <a:pPr marL="0" indent="0">
-              <a:buNone/>
-            </a:pPr>
-            <a:r>
-              <a:rPr lang="en-GB" dirty="0"/>
+              <a:rPr lang="en-GB" sz="3200" dirty="0"/>
               <a:t>Partitions in the table move “forward” but the overall number of partitions remains the same</a:t>
             </a:r>
-            <a:endParaRPr lang="en-IE" dirty="0"/>
+            <a:endParaRPr lang="en-IE" sz="3200" dirty="0"/>
           </a:p>
         </p:txBody>
       </p:sp>
@@ -8257,16 +8221,23 @@
             <p:ph idx="1"/>
           </p:nvPr>
         </p:nvSpPr>
-        <p:spPr/>
-        <p:txBody>
-          <a:bodyPr/>
+        <p:spPr>
+          <a:xfrm>
+            <a:off x="838200" y="1965888"/>
+            <a:ext cx="10515600" cy="4351338"/>
+          </a:xfrm>
+        </p:spPr>
+        <p:txBody>
+          <a:bodyPr>
+            <a:normAutofit/>
+          </a:bodyPr>
           <a:lstStyle/>
           <a:p>
             <a:pPr marL="514350" indent="-514350">
               <a:buAutoNum type="arabicPeriod"/>
             </a:pPr>
             <a:r>
-              <a:rPr lang="en-GB" dirty="0"/>
+              <a:rPr lang="en-GB" sz="3200" dirty="0"/>
               <a:t>SWITCH oldest partition in live table to archive table</a:t>
             </a:r>
           </a:p>
@@ -8275,7 +8246,7 @@
               <a:buAutoNum type="arabicPeriod"/>
             </a:pPr>
             <a:r>
-              <a:rPr lang="en-GB" dirty="0"/>
+              <a:rPr lang="en-GB" sz="3200" dirty="0"/>
               <a:t>MERGE oldest partition</a:t>
             </a:r>
           </a:p>
@@ -8284,7 +8255,7 @@
               <a:buAutoNum type="arabicPeriod"/>
             </a:pPr>
             <a:r>
-              <a:rPr lang="en-GB" dirty="0"/>
+              <a:rPr lang="en-GB" sz="3200" dirty="0"/>
               <a:t>SPLIT new partition</a:t>
             </a:r>
           </a:p>
@@ -8293,7 +8264,7 @@
               <a:buAutoNum type="arabicPeriod"/>
             </a:pPr>
             <a:r>
-              <a:rPr lang="en-GB" dirty="0"/>
+              <a:rPr lang="en-GB" sz="3200" dirty="0"/>
               <a:t>Load new data into staging table</a:t>
             </a:r>
           </a:p>
@@ -8302,7 +8273,7 @@
               <a:buAutoNum type="arabicPeriod"/>
             </a:pPr>
             <a:r>
-              <a:rPr lang="en-GB" dirty="0"/>
+              <a:rPr lang="en-GB" sz="3200" dirty="0"/>
               <a:t>SWITCH data from staging table to live table</a:t>
             </a:r>
           </a:p>
@@ -8311,10 +8282,10 @@
               <a:buAutoNum type="arabicPeriod"/>
             </a:pPr>
             <a:r>
-              <a:rPr lang="en-GB" dirty="0"/>
+              <a:rPr lang="en-GB" sz="3200" dirty="0"/>
               <a:t>Update statistics on live table</a:t>
             </a:r>
-            <a:endParaRPr lang="en-IE" dirty="0"/>
+            <a:endParaRPr lang="en-IE" sz="3200" dirty="0"/>
           </a:p>
         </p:txBody>
       </p:sp>
@@ -8550,77 +8521,63 @@
       </p:sp>
       <p:sp>
         <p:nvSpPr>
-          <p:cNvPr id="3" name="Content Placeholder 2">
+          <p:cNvPr id="4" name="TextBox 3">
             <a:extLst>
               <a:ext uri="{FF2B5EF4-FFF2-40B4-BE49-F238E27FC236}">
-                <a16:creationId xmlns:a16="http://schemas.microsoft.com/office/drawing/2014/main" id="{2CADD52D-D0A1-4DC6-B975-12A205A2BEF1}"/>
+                <a16:creationId xmlns:a16="http://schemas.microsoft.com/office/drawing/2014/main" id="{20BDBE67-F44E-4BE4-A6CA-B5E4A56E6312}"/>
               </a:ext>
             </a:extLst>
           </p:cNvPr>
-          <p:cNvSpPr>
-            <a:spLocks noGrp="1"/>
-          </p:cNvSpPr>
-          <p:nvPr>
-            <p:ph idx="1"/>
-          </p:nvPr>
-        </p:nvSpPr>
-        <p:spPr/>
-        <p:txBody>
-          <a:bodyPr/>
-          <a:lstStyle/>
-          <a:p>
-            <a:pPr marL="0" indent="0">
-              <a:buNone/>
-            </a:pPr>
-            <a:r>
-              <a:rPr lang="en-GB" dirty="0"/>
+          <p:cNvSpPr txBox="1"/>
+          <p:nvPr/>
+        </p:nvSpPr>
+        <p:spPr>
+          <a:xfrm>
+            <a:off x="1086568" y="2013228"/>
+            <a:ext cx="10018863" cy="2831544"/>
+          </a:xfrm>
+          <a:prstGeom prst="rect">
+            <a:avLst/>
+          </a:prstGeom>
+          <a:noFill/>
+        </p:spPr>
+        <p:txBody>
+          <a:bodyPr wrap="square" rtlCol="0">
+            <a:spAutoFit/>
+          </a:bodyPr>
+          <a:lstStyle/>
+          <a:p>
+            <a:r>
+              <a:rPr lang="en-GB" sz="3200" dirty="0"/>
               <a:t>Can be useful for VLDBs</a:t>
             </a:r>
           </a:p>
           <a:p>
-            <a:pPr marL="0" indent="0">
-              <a:buNone/>
-            </a:pPr>
-            <a:endParaRPr lang="en-GB" dirty="0"/>
-          </a:p>
-          <a:p>
-            <a:pPr marL="0" indent="0">
-              <a:buNone/>
-            </a:pPr>
-            <a:r>
-              <a:rPr lang="en-GB" dirty="0"/>
+            <a:r>
+              <a:rPr lang="en-GB" sz="3200" dirty="0"/>
+              <a:t>Can be used to restore live partitions to development </a:t>
+            </a:r>
+          </a:p>
+          <a:p>
+            <a:r>
+              <a:rPr lang="en-GB" sz="3200" dirty="0"/>
               <a:t>Individual partitions are on different filegroups</a:t>
             </a:r>
           </a:p>
           <a:p>
-            <a:pPr marL="0" indent="0">
-              <a:buNone/>
-            </a:pPr>
-            <a:endParaRPr lang="en-GB" dirty="0"/>
-          </a:p>
-          <a:p>
-            <a:pPr marL="0" indent="0">
-              <a:buNone/>
-            </a:pPr>
-            <a:r>
-              <a:rPr lang="en-GB" dirty="0"/>
-              <a:t>Data in older partitions does not change</a:t>
-            </a:r>
-          </a:p>
-          <a:p>
-            <a:pPr marL="0" indent="0">
-              <a:buNone/>
-            </a:pPr>
-            <a:endParaRPr lang="en-GB" dirty="0"/>
-          </a:p>
-          <a:p>
-            <a:pPr marL="0" indent="0">
-              <a:buNone/>
-            </a:pPr>
-            <a:r>
-              <a:rPr lang="en-GB" dirty="0"/>
+            <a:r>
+              <a:rPr lang="en-GB" sz="3200" dirty="0"/>
+              <a:t>Data in older partitions does not change or is not needed </a:t>
+            </a:r>
+          </a:p>
+          <a:p>
+            <a:r>
+              <a:rPr lang="en-GB" sz="3200" dirty="0"/>
               <a:t>Reduce recovery time for “active” data</a:t>
             </a:r>
+            <a:endParaRPr lang="en-IE" sz="3200" dirty="0"/>
+          </a:p>
+          <a:p>
             <a:endParaRPr lang="en-IE" dirty="0"/>
           </a:p>
         </p:txBody>
@@ -8750,16 +8707,19 @@
         </p:nvSpPr>
         <p:spPr>
           <a:xfrm>
-            <a:off x="326923" y="530942"/>
-            <a:ext cx="10515600" cy="737420"/>
+            <a:off x="1133169" y="3060290"/>
+            <a:ext cx="3389671" cy="737420"/>
           </a:xfrm>
         </p:spPr>
         <p:txBody>
-          <a:bodyPr/>
-          <a:lstStyle/>
-          <a:p>
-            <a:r>
-              <a:rPr lang="en-GB" dirty="0">
+          <a:bodyPr>
+            <a:noAutofit/>
+          </a:bodyPr>
+          <a:lstStyle/>
+          <a:p>
+            <a:pPr algn="ctr"/>
+            <a:r>
+              <a:rPr lang="en-GB" sz="6000" dirty="0">
                 <a:solidFill>
                   <a:schemeClr val="accent1">
                     <a:lumMod val="75000"/>
@@ -8768,7 +8728,7 @@
               </a:rPr>
               <a:t>A quick story</a:t>
             </a:r>
-            <a:endParaRPr lang="en-IE" dirty="0">
+            <a:endParaRPr lang="en-IE" sz="6000" dirty="0">
               <a:solidFill>
                 <a:schemeClr val="accent1">
                   <a:lumMod val="75000"/>
@@ -8778,31 +8738,41 @@
           </a:p>
         </p:txBody>
       </p:sp>
-      <p:sp>
-        <p:nvSpPr>
-          <p:cNvPr id="3" name="Content Placeholder 2">
+      <p:pic>
+        <p:nvPicPr>
+          <p:cNvPr id="14" name="Content Placeholder 13">
             <a:extLst>
               <a:ext uri="{FF2B5EF4-FFF2-40B4-BE49-F238E27FC236}">
-                <a16:creationId xmlns:a16="http://schemas.microsoft.com/office/drawing/2014/main" id="{54EDE585-0FD9-4476-891F-8B898450614A}"/>
+                <a16:creationId xmlns:a16="http://schemas.microsoft.com/office/drawing/2014/main" id="{8CAF58FB-D7CF-4417-8D15-C8847A91B5D7}"/>
               </a:ext>
             </a:extLst>
           </p:cNvPr>
-          <p:cNvSpPr>
-            <a:spLocks noGrp="1"/>
-          </p:cNvSpPr>
+          <p:cNvPicPr>
+            <a:picLocks noGrp="1" noChangeAspect="1"/>
+          </p:cNvPicPr>
           <p:nvPr>
             <p:ph idx="1"/>
           </p:nvPr>
-        </p:nvSpPr>
-        <p:spPr/>
-        <p:txBody>
-          <a:bodyPr/>
-          <a:lstStyle/>
-          <a:p>
-            <a:endParaRPr lang="en-IE"/>
-          </a:p>
-        </p:txBody>
-      </p:sp>
+        </p:nvPicPr>
+        <p:blipFill>
+          <a:blip r:embed="rId2">
+            <a:extLst>
+              <a:ext uri="{28A0092B-C50C-407E-A947-70E740481C1C}">
+                <a14:useLocalDpi xmlns:a14="http://schemas.microsoft.com/office/drawing/2010/main" val="0"/>
+              </a:ext>
+            </a:extLst>
+          </a:blip>
+          <a:stretch>
+            <a:fillRect/>
+          </a:stretch>
+        </p:blipFill>
+        <p:spPr>
+          <a:xfrm>
+            <a:off x="5536276" y="835526"/>
+            <a:ext cx="5253643" cy="5186947"/>
+          </a:xfrm>
+        </p:spPr>
+      </p:pic>
     </p:spTree>
     <p:extLst>
       <p:ext uri="{BB962C8B-B14F-4D97-AF65-F5344CB8AC3E}">
@@ -8895,12 +8865,104 @@
             <p:ph idx="1"/>
           </p:nvPr>
         </p:nvSpPr>
-        <p:spPr/>
+        <p:spPr>
+          <a:xfrm>
+            <a:off x="731520" y="1825625"/>
+            <a:ext cx="11039302" cy="4351338"/>
+          </a:xfrm>
+        </p:spPr>
         <p:txBody>
           <a:bodyPr/>
           <a:lstStyle/>
           <a:p>
-            <a:endParaRPr lang="en-IE"/>
+            <a:pPr marL="0" indent="0">
+              <a:buNone/>
+            </a:pPr>
+            <a:r>
+              <a:rPr lang="en-IE" dirty="0">
+                <a:hlinkClick r:id="rId2"/>
+              </a:rPr>
+              <a:t>https://github.com/dbafromthecold/IntroToPartitioning</a:t>
+            </a:r>
+            <a:r>
+              <a:rPr lang="en-IE" dirty="0"/>
+              <a:t> </a:t>
+            </a:r>
+          </a:p>
+          <a:p>
+            <a:pPr marL="0" indent="0">
+              <a:buNone/>
+            </a:pPr>
+            <a:endParaRPr lang="en-GB" dirty="0"/>
+          </a:p>
+          <a:p>
+            <a:pPr marL="0" indent="0">
+              <a:buNone/>
+            </a:pPr>
+            <a:r>
+              <a:rPr lang="en-IE" dirty="0">
+                <a:hlinkClick r:id="rId3"/>
+              </a:rPr>
+              <a:t>https://dbafromthecold.com/2014/06/04/partitioning-basics-part-1/</a:t>
+            </a:r>
+            <a:r>
+              <a:rPr lang="en-IE" dirty="0"/>
+              <a:t> </a:t>
+            </a:r>
+          </a:p>
+          <a:p>
+            <a:pPr marL="0" indent="0">
+              <a:buNone/>
+            </a:pPr>
+            <a:endParaRPr lang="en-GB" dirty="0"/>
+          </a:p>
+          <a:p>
+            <a:pPr marL="0" indent="0">
+              <a:buNone/>
+            </a:pPr>
+            <a:r>
+              <a:rPr lang="en-IE" dirty="0">
+                <a:hlinkClick r:id="rId4"/>
+              </a:rPr>
+              <a:t>https://docs.microsoft.com/en-us/sql/relational-databases/partitions/partitioned-tables-and-indexes</a:t>
+            </a:r>
+            <a:r>
+              <a:rPr lang="en-IE" dirty="0"/>
+              <a:t> </a:t>
+            </a:r>
+          </a:p>
+          <a:p>
+            <a:pPr marL="0" indent="0">
+              <a:buNone/>
+            </a:pPr>
+            <a:endParaRPr lang="en-GB" dirty="0"/>
+          </a:p>
+          <a:p>
+            <a:pPr marL="0" indent="0">
+              <a:buNone/>
+            </a:pPr>
+            <a:r>
+              <a:rPr lang="en-IE" dirty="0">
+                <a:hlinkClick r:id="rId5"/>
+              </a:rPr>
+              <a:t>https://technet.microsoft.com/en-us/library/ms187526(v=sql.105).aspx</a:t>
+            </a:r>
+            <a:r>
+              <a:rPr lang="en-IE" dirty="0"/>
+              <a:t> </a:t>
+            </a:r>
+          </a:p>
+          <a:p>
+            <a:pPr marL="0" indent="0">
+              <a:buNone/>
+            </a:pPr>
+            <a:endParaRPr lang="en-GB" dirty="0"/>
+          </a:p>
+          <a:p>
+            <a:pPr marL="0" indent="0">
+              <a:buNone/>
+            </a:pPr>
+            <a:endParaRPr lang="en-IE" dirty="0"/>
           </a:p>
         </p:txBody>
       </p:sp>
@@ -9241,7 +9303,7 @@
               <a:buNone/>
             </a:pPr>
             <a:r>
-              <a:rPr lang="en-US" sz="4400" dirty="0">
+              <a:rPr lang="en-US" sz="3200" dirty="0">
                 <a:solidFill>
                   <a:srgbClr val="222222"/>
                 </a:solidFill>
@@ -9250,7 +9312,7 @@
               </a:rPr>
               <a:t>We love to get feedback</a:t>
             </a:r>
-            <a:endParaRPr lang="en-US" sz="4400" dirty="0">
+            <a:endParaRPr lang="en-US" sz="3200" dirty="0">
               <a:cs typeface="Calibri"/>
             </a:endParaRPr>
           </a:p>
@@ -9258,7 +9320,7 @@
             <a:pPr marL="0" indent="0" algn="ctr">
               <a:buNone/>
             </a:pPr>
-            <a:endParaRPr lang="en-US" sz="4400" dirty="0">
+            <a:endParaRPr lang="en-US" sz="3200" dirty="0">
               <a:solidFill>
                 <a:srgbClr val="222222"/>
               </a:solidFill>
@@ -9271,7 +9333,7 @@
               <a:buNone/>
             </a:pPr>
             <a:r>
-              <a:rPr lang="en-US" sz="4400" dirty="0">
+              <a:rPr lang="en-US" sz="3200" dirty="0">
                 <a:solidFill>
                   <a:srgbClr val="222222"/>
                 </a:solidFill>
@@ -9281,7 +9343,7 @@
               <a:t>Please complete the </a:t>
             </a:r>
             <a:r>
-              <a:rPr lang="en-US" sz="4400" dirty="0">
+              <a:rPr lang="en-US" sz="3200" dirty="0">
                 <a:solidFill>
                   <a:srgbClr val="222222"/>
                 </a:solidFill>
@@ -9396,8 +9458,8 @@
         </p:nvSpPr>
         <p:spPr>
           <a:xfrm>
-            <a:off x="838200" y="2395896"/>
-            <a:ext cx="10515600" cy="4351338"/>
+            <a:off x="838200" y="2445174"/>
+            <a:ext cx="10515600" cy="2749682"/>
           </a:xfrm>
         </p:spPr>
         <p:txBody>
@@ -9408,10 +9470,32 @@
               <a:buNone/>
             </a:pPr>
             <a:r>
-              <a:rPr lang="en-US" sz="3600" dirty="0">
+              <a:rPr lang="en-US" sz="3200" dirty="0">
                 <a:cs typeface="Calibri"/>
               </a:rPr>
-              <a:t>Please visit Community Corner, we are trying this year to get more people to learn about the SQL Community, equally if you would be happy to visit the community corner we’d really appreciate it.</a:t>
+              <a:t>Please visit Community Corner</a:t>
+            </a:r>
+          </a:p>
+          <a:p>
+            <a:pPr marL="0" indent="0">
+              <a:buNone/>
+            </a:pPr>
+            <a:r>
+              <a:rPr lang="en-US" sz="3200" dirty="0">
+                <a:cs typeface="Calibri"/>
+              </a:rPr>
+              <a:t>We are trying this year to get more people to learn about the SQL Community</a:t>
+            </a:r>
+          </a:p>
+          <a:p>
+            <a:pPr marL="0" indent="0">
+              <a:buNone/>
+            </a:pPr>
+            <a:r>
+              <a:rPr lang="en-US" sz="3200" dirty="0">
+                <a:cs typeface="Calibri"/>
+              </a:rPr>
+              <a:t>If you would be happy to visit the community corner we’d really appreciate it</a:t>
             </a:r>
           </a:p>
           <a:p>

</xml_diff>

<commit_message>
Added Summary of Partitioning Series to resources slide
</commit_message>
<xml_diff>
--- a/Intro to Partitioning.pptx
+++ b/Intro to Partitioning.pptx
@@ -8879,13 +8879,13 @@
               <a:buNone/>
             </a:pPr>
             <a:r>
-              <a:rPr lang="en-IE" dirty="0">
+              <a:rPr lang="en-IE" sz="2400" dirty="0">
                 <a:hlinkClick r:id="rId2"/>
               </a:rPr>
               <a:t>https://github.com/dbafromthecold/IntroToPartitioning</a:t>
             </a:r>
             <a:r>
-              <a:rPr lang="en-IE" dirty="0"/>
+              <a:rPr lang="en-IE" sz="2400" dirty="0"/>
               <a:t> </a:t>
             </a:r>
           </a:p>
@@ -8893,20 +8893,20 @@
             <a:pPr marL="0" indent="0">
               <a:buNone/>
             </a:pPr>
-            <a:endParaRPr lang="en-GB" dirty="0"/>
+            <a:endParaRPr lang="en-GB" sz="2400" dirty="0"/>
           </a:p>
           <a:p>
             <a:pPr marL="0" indent="0">
               <a:buNone/>
             </a:pPr>
             <a:r>
-              <a:rPr lang="en-IE" dirty="0">
+              <a:rPr lang="en-IE" sz="2400" dirty="0">
                 <a:hlinkClick r:id="rId3"/>
               </a:rPr>
-              <a:t>https://dbafromthecold.com/2014/06/04/partitioning-basics-part-1/</a:t>
-            </a:r>
-            <a:r>
-              <a:rPr lang="en-IE" dirty="0"/>
+              <a:t>https://dbafromthecold.com/2018/02/19/summary-of-my-partitioning-series/</a:t>
+            </a:r>
+            <a:r>
+              <a:rPr lang="en-IE" sz="2400" dirty="0"/>
               <a:t> </a:t>
             </a:r>
           </a:p>
@@ -8914,20 +8914,20 @@
             <a:pPr marL="0" indent="0">
               <a:buNone/>
             </a:pPr>
-            <a:endParaRPr lang="en-GB" dirty="0"/>
+            <a:endParaRPr lang="en-GB" sz="2400" dirty="0"/>
           </a:p>
           <a:p>
             <a:pPr marL="0" indent="0">
               <a:buNone/>
             </a:pPr>
             <a:r>
-              <a:rPr lang="en-IE" dirty="0">
+              <a:rPr lang="en-IE" sz="2400" dirty="0">
                 <a:hlinkClick r:id="rId4"/>
               </a:rPr>
               <a:t>https://docs.microsoft.com/en-us/sql/relational-databases/partitions/partitioned-tables-and-indexes</a:t>
             </a:r>
             <a:r>
-              <a:rPr lang="en-IE" dirty="0"/>
+              <a:rPr lang="en-IE" sz="2400" dirty="0"/>
               <a:t> </a:t>
             </a:r>
           </a:p>
@@ -8935,20 +8935,20 @@
             <a:pPr marL="0" indent="0">
               <a:buNone/>
             </a:pPr>
-            <a:endParaRPr lang="en-GB" dirty="0"/>
+            <a:endParaRPr lang="en-GB" sz="2400" dirty="0"/>
           </a:p>
           <a:p>
             <a:pPr marL="0" indent="0">
               <a:buNone/>
             </a:pPr>
             <a:r>
-              <a:rPr lang="en-IE" dirty="0">
+              <a:rPr lang="en-IE" sz="2400" dirty="0">
                 <a:hlinkClick r:id="rId5"/>
               </a:rPr>
               <a:t>https://technet.microsoft.com/en-us/library/ms187526(v=sql.105).aspx</a:t>
             </a:r>
             <a:r>
-              <a:rPr lang="en-IE" dirty="0"/>
+              <a:rPr lang="en-IE" sz="2400" dirty="0"/>
               <a:t> </a:t>
             </a:r>
           </a:p>

</xml_diff>

<commit_message>
final updated to slides (hopefully)
</commit_message>
<xml_diff>
--- a/Intro to Partitioning.pptx
+++ b/Intro to Partitioning.pptx
@@ -248,7 +248,7 @@
           <a:p>
             <a:fld id="{5DD5D27D-F6C1-457C-97EB-5B89E5036C9E}" type="datetimeFigureOut">
               <a:rPr lang="en-IE" smtClean="0"/>
-              <a:t>19/02/2018</a:t>
+              <a:t>21/02/2018</a:t>
             </a:fld>
             <a:endParaRPr lang="en-IE"/>
           </a:p>
@@ -647,7 +647,7 @@
           <a:p>
             <a:fld id="{A64C863B-FA9B-4512-A178-D5CD000B838D}" type="datetimeFigureOut">
               <a:rPr lang="en-GB" smtClean="0"/>
-              <a:t>19/02/2018</a:t>
+              <a:t>21/02/2018</a:t>
             </a:fld>
             <a:endParaRPr lang="en-GB"/>
           </a:p>
@@ -817,7 +817,7 @@
           <a:p>
             <a:fld id="{A64C863B-FA9B-4512-A178-D5CD000B838D}" type="datetimeFigureOut">
               <a:rPr lang="en-GB" smtClean="0"/>
-              <a:t>19/02/2018</a:t>
+              <a:t>21/02/2018</a:t>
             </a:fld>
             <a:endParaRPr lang="en-GB"/>
           </a:p>
@@ -997,7 +997,7 @@
           <a:p>
             <a:fld id="{A64C863B-FA9B-4512-A178-D5CD000B838D}" type="datetimeFigureOut">
               <a:rPr lang="en-GB" smtClean="0"/>
-              <a:t>19/02/2018</a:t>
+              <a:t>21/02/2018</a:t>
             </a:fld>
             <a:endParaRPr lang="en-GB"/>
           </a:p>
@@ -1167,7 +1167,7 @@
           <a:p>
             <a:fld id="{A64C863B-FA9B-4512-A178-D5CD000B838D}" type="datetimeFigureOut">
               <a:rPr lang="en-GB" smtClean="0"/>
-              <a:t>19/02/2018</a:t>
+              <a:t>21/02/2018</a:t>
             </a:fld>
             <a:endParaRPr lang="en-GB"/>
           </a:p>
@@ -1413,7 +1413,7 @@
           <a:p>
             <a:fld id="{A64C863B-FA9B-4512-A178-D5CD000B838D}" type="datetimeFigureOut">
               <a:rPr lang="en-GB" smtClean="0"/>
-              <a:t>19/02/2018</a:t>
+              <a:t>21/02/2018</a:t>
             </a:fld>
             <a:endParaRPr lang="en-GB"/>
           </a:p>
@@ -1645,7 +1645,7 @@
           <a:p>
             <a:fld id="{A64C863B-FA9B-4512-A178-D5CD000B838D}" type="datetimeFigureOut">
               <a:rPr lang="en-GB" smtClean="0"/>
-              <a:t>19/02/2018</a:t>
+              <a:t>21/02/2018</a:t>
             </a:fld>
             <a:endParaRPr lang="en-GB"/>
           </a:p>
@@ -2012,7 +2012,7 @@
           <a:p>
             <a:fld id="{A64C863B-FA9B-4512-A178-D5CD000B838D}" type="datetimeFigureOut">
               <a:rPr lang="en-GB" smtClean="0"/>
-              <a:t>19/02/2018</a:t>
+              <a:t>21/02/2018</a:t>
             </a:fld>
             <a:endParaRPr lang="en-GB"/>
           </a:p>
@@ -2130,7 +2130,7 @@
           <a:p>
             <a:fld id="{A64C863B-FA9B-4512-A178-D5CD000B838D}" type="datetimeFigureOut">
               <a:rPr lang="en-GB" smtClean="0"/>
-              <a:t>19/02/2018</a:t>
+              <a:t>21/02/2018</a:t>
             </a:fld>
             <a:endParaRPr lang="en-GB"/>
           </a:p>
@@ -2225,7 +2225,7 @@
           <a:p>
             <a:fld id="{A64C863B-FA9B-4512-A178-D5CD000B838D}" type="datetimeFigureOut">
               <a:rPr lang="en-GB" smtClean="0"/>
-              <a:t>19/02/2018</a:t>
+              <a:t>21/02/2018</a:t>
             </a:fld>
             <a:endParaRPr lang="en-GB"/>
           </a:p>
@@ -2502,7 +2502,7 @@
           <a:p>
             <a:fld id="{A64C863B-FA9B-4512-A178-D5CD000B838D}" type="datetimeFigureOut">
               <a:rPr lang="en-GB" smtClean="0"/>
-              <a:t>19/02/2018</a:t>
+              <a:t>21/02/2018</a:t>
             </a:fld>
             <a:endParaRPr lang="en-GB"/>
           </a:p>
@@ -2755,7 +2755,7 @@
           <a:p>
             <a:fld id="{A64C863B-FA9B-4512-A178-D5CD000B838D}" type="datetimeFigureOut">
               <a:rPr lang="en-GB" smtClean="0"/>
-              <a:t>19/02/2018</a:t>
+              <a:t>21/02/2018</a:t>
             </a:fld>
             <a:endParaRPr lang="en-GB"/>
           </a:p>
@@ -2977,7 +2977,7 @@
           <a:p>
             <a:fld id="{A64C863B-FA9B-4512-A178-D5CD000B838D}" type="datetimeFigureOut">
               <a:rPr lang="en-GB" smtClean="0"/>
-              <a:t>19/02/2018</a:t>
+              <a:t>21/02/2018</a:t>
             </a:fld>
             <a:endParaRPr lang="en-GB"/>
           </a:p>

</xml_diff>